<commit_message>
new deck with more up-to-date formatting sql tweak
</commit_message>
<xml_diff>
--- a/SQL Query Tips and Tricks/Data Relay/SQL Query Talk - Data Relay.pptx
+++ b/SQL Query Tips and Tricks/Data Relay/SQL Query Talk - Data Relay.pptx
@@ -5,13 +5,15 @@
     <p:sldMasterId id="2147483648" r:id="rId4"/>
   </p:sldMasterIdLst>
   <p:notesMasterIdLst>
-    <p:notesMasterId r:id="rId9"/>
+    <p:notesMasterId r:id="rId11"/>
   </p:notesMasterIdLst>
   <p:sldIdLst>
     <p:sldId id="4113" r:id="rId5"/>
     <p:sldId id="4116" r:id="rId6"/>
     <p:sldId id="4118" r:id="rId7"/>
     <p:sldId id="4119" r:id="rId8"/>
+    <p:sldId id="258" r:id="rId9"/>
+    <p:sldId id="296" r:id="rId10"/>
   </p:sldIdLst>
   <p:sldSz cx="12192000" cy="6858000"/>
   <p:notesSz cx="6858000" cy="9144000"/>
@@ -419,7 +421,7 @@
           <a:p>
             <a:fld id="{DE126399-7E51-4369-B6E4-E2FF6F9ABB13}" type="datetimeFigureOut">
               <a:rPr lang="en-GB" smtClean="0"/>
-              <a:t>25/09/2022</a:t>
+              <a:t>30/09/2022</a:t>
             </a:fld>
             <a:endParaRPr lang="en-GB"/>
           </a:p>
@@ -836,7 +838,7 @@
           <a:p>
             <a:fld id="{97C62E4C-047F-4BB8-A7D6-928F0B6097C5}" type="datetimeFigureOut">
               <a:rPr lang="en-GB" smtClean="0"/>
-              <a:t>25/09/2022</a:t>
+              <a:t>30/09/2022</a:t>
             </a:fld>
             <a:endParaRPr lang="en-GB"/>
           </a:p>
@@ -1036,7 +1038,7 @@
           <a:p>
             <a:fld id="{97C62E4C-047F-4BB8-A7D6-928F0B6097C5}" type="datetimeFigureOut">
               <a:rPr lang="en-GB" smtClean="0"/>
-              <a:t>25/09/2022</a:t>
+              <a:t>30/09/2022</a:t>
             </a:fld>
             <a:endParaRPr lang="en-GB"/>
           </a:p>
@@ -1246,7 +1248,7 @@
           <a:p>
             <a:fld id="{97C62E4C-047F-4BB8-A7D6-928F0B6097C5}" type="datetimeFigureOut">
               <a:rPr lang="en-GB" smtClean="0"/>
-              <a:t>25/09/2022</a:t>
+              <a:t>30/09/2022</a:t>
             </a:fld>
             <a:endParaRPr lang="en-GB"/>
           </a:p>
@@ -1310,6 +1312,110 @@
     <p:extLst>
       <p:ext uri="{BB962C8B-B14F-4D97-AF65-F5344CB8AC3E}">
         <p14:creationId xmlns:p14="http://schemas.microsoft.com/office/powerpoint/2010/main" val="3344413940"/>
+      </p:ext>
+    </p:extLst>
+  </p:cSld>
+  <p:clrMapOvr>
+    <a:masterClrMapping/>
+  </p:clrMapOvr>
+</p:sldLayout>
+</file>
+
+<file path=ppt/slideLayouts/slideLayout12.xml><?xml version="1.0" encoding="utf-8"?>
+<p:sldLayout xmlns:a="http://schemas.openxmlformats.org/drawingml/2006/main" xmlns:r="http://schemas.openxmlformats.org/officeDocument/2006/relationships" xmlns:p="http://schemas.openxmlformats.org/presentationml/2006/main" userDrawn="1">
+  <p:cSld name="1_Title Slide">
+    <p:spTree>
+      <p:nvGrpSpPr>
+        <p:cNvPr id="1" name=""/>
+        <p:cNvGrpSpPr/>
+        <p:nvPr/>
+      </p:nvGrpSpPr>
+      <p:grpSpPr>
+        <a:xfrm>
+          <a:off x="0" y="0"/>
+          <a:ext cx="0" cy="0"/>
+          <a:chOff x="0" y="0"/>
+          <a:chExt cx="0" cy="0"/>
+        </a:xfrm>
+      </p:grpSpPr>
+      <p:pic>
+        <p:nvPicPr>
+          <p:cNvPr id="11" name="Picture 10">
+            <a:extLst>
+              <a:ext uri="{FF2B5EF4-FFF2-40B4-BE49-F238E27FC236}">
+                <a16:creationId xmlns:a16="http://schemas.microsoft.com/office/drawing/2014/main" id="{F15721F1-963B-2349-8BC7-E7480791D6D0}"/>
+              </a:ext>
+            </a:extLst>
+          </p:cNvPr>
+          <p:cNvPicPr>
+            <a:picLocks noChangeAspect="1"/>
+          </p:cNvPicPr>
+          <p:nvPr userDrawn="1"/>
+        </p:nvPicPr>
+        <p:blipFill>
+          <a:blip r:embed="rId2">
+            <a:extLst>
+              <a:ext uri="{28A0092B-C50C-407E-A947-70E740481C1C}">
+                <a14:useLocalDpi xmlns:a14="http://schemas.microsoft.com/office/drawing/2010/main" val="0"/>
+              </a:ext>
+            </a:extLst>
+          </a:blip>
+          <a:stretch>
+            <a:fillRect/>
+          </a:stretch>
+        </p:blipFill>
+        <p:spPr>
+          <a:xfrm>
+            <a:off x="0" y="-1295400"/>
+            <a:ext cx="12192000" cy="6858000"/>
+          </a:xfrm>
+          <a:prstGeom prst="rect">
+            <a:avLst/>
+          </a:prstGeom>
+        </p:spPr>
+      </p:pic>
+      <p:sp>
+        <p:nvSpPr>
+          <p:cNvPr id="9" name="Title Placeholder 1">
+            <a:extLst>
+              <a:ext uri="{FF2B5EF4-FFF2-40B4-BE49-F238E27FC236}">
+                <a16:creationId xmlns:a16="http://schemas.microsoft.com/office/drawing/2014/main" id="{54055D8A-23A2-4D40-B505-C0406E5EF41D}"/>
+              </a:ext>
+            </a:extLst>
+          </p:cNvPr>
+          <p:cNvSpPr>
+            <a:spLocks noGrp="1"/>
+          </p:cNvSpPr>
+          <p:nvPr>
+            <p:ph type="title"/>
+          </p:nvPr>
+        </p:nvSpPr>
+        <p:spPr>
+          <a:xfrm>
+            <a:off x="838200" y="2743200"/>
+            <a:ext cx="10515600" cy="762000"/>
+          </a:xfrm>
+          <a:prstGeom prst="rect">
+            <a:avLst/>
+          </a:prstGeom>
+        </p:spPr>
+        <p:txBody>
+          <a:bodyPr vert="horz" lIns="91440" tIns="45720" rIns="91440" bIns="45720" rtlCol="0" anchor="ctr">
+            <a:normAutofit/>
+          </a:bodyPr>
+          <a:lstStyle/>
+          <a:p>
+            <a:r>
+              <a:rPr lang="en-US" dirty="0"/>
+              <a:t>Click to edit Master title style</a:t>
+            </a:r>
+          </a:p>
+        </p:txBody>
+      </p:sp>
+    </p:spTree>
+    <p:extLst>
+      <p:ext uri="{BB962C8B-B14F-4D97-AF65-F5344CB8AC3E}">
+        <p14:creationId xmlns:p14="http://schemas.microsoft.com/office/powerpoint/2010/main" val="460536271"/>
       </p:ext>
     </p:extLst>
   </p:cSld>
@@ -1446,7 +1552,7 @@
           <a:p>
             <a:fld id="{97C62E4C-047F-4BB8-A7D6-928F0B6097C5}" type="datetimeFigureOut">
               <a:rPr lang="en-GB" smtClean="0"/>
-              <a:t>25/09/2022</a:t>
+              <a:t>30/09/2022</a:t>
             </a:fld>
             <a:endParaRPr lang="en-GB"/>
           </a:p>
@@ -1722,7 +1828,7 @@
           <a:p>
             <a:fld id="{97C62E4C-047F-4BB8-A7D6-928F0B6097C5}" type="datetimeFigureOut">
               <a:rPr lang="en-GB" smtClean="0"/>
-              <a:t>25/09/2022</a:t>
+              <a:t>30/09/2022</a:t>
             </a:fld>
             <a:endParaRPr lang="en-GB"/>
           </a:p>
@@ -1990,7 +2096,7 @@
           <a:p>
             <a:fld id="{97C62E4C-047F-4BB8-A7D6-928F0B6097C5}" type="datetimeFigureOut">
               <a:rPr lang="en-GB" smtClean="0"/>
-              <a:t>25/09/2022</a:t>
+              <a:t>30/09/2022</a:t>
             </a:fld>
             <a:endParaRPr lang="en-GB"/>
           </a:p>
@@ -2405,7 +2511,7 @@
           <a:p>
             <a:fld id="{97C62E4C-047F-4BB8-A7D6-928F0B6097C5}" type="datetimeFigureOut">
               <a:rPr lang="en-GB" smtClean="0"/>
-              <a:t>25/09/2022</a:t>
+              <a:t>30/09/2022</a:t>
             </a:fld>
             <a:endParaRPr lang="en-GB"/>
           </a:p>
@@ -2547,7 +2653,7 @@
           <a:p>
             <a:fld id="{97C62E4C-047F-4BB8-A7D6-928F0B6097C5}" type="datetimeFigureOut">
               <a:rPr lang="en-GB" smtClean="0"/>
-              <a:t>25/09/2022</a:t>
+              <a:t>30/09/2022</a:t>
             </a:fld>
             <a:endParaRPr lang="en-GB"/>
           </a:p>
@@ -2660,7 +2766,7 @@
           <a:p>
             <a:fld id="{97C62E4C-047F-4BB8-A7D6-928F0B6097C5}" type="datetimeFigureOut">
               <a:rPr lang="en-GB" smtClean="0"/>
-              <a:t>25/09/2022</a:t>
+              <a:t>30/09/2022</a:t>
             </a:fld>
             <a:endParaRPr lang="en-GB"/>
           </a:p>
@@ -2973,7 +3079,7 @@
           <a:p>
             <a:fld id="{97C62E4C-047F-4BB8-A7D6-928F0B6097C5}" type="datetimeFigureOut">
               <a:rPr lang="en-GB" smtClean="0"/>
-              <a:t>25/09/2022</a:t>
+              <a:t>30/09/2022</a:t>
             </a:fld>
             <a:endParaRPr lang="en-GB"/>
           </a:p>
@@ -3266,7 +3372,7 @@
           <a:p>
             <a:fld id="{97C62E4C-047F-4BB8-A7D6-928F0B6097C5}" type="datetimeFigureOut">
               <a:rPr lang="en-GB" smtClean="0"/>
-              <a:t>25/09/2022</a:t>
+              <a:t>30/09/2022</a:t>
             </a:fld>
             <a:endParaRPr lang="en-GB"/>
           </a:p>
@@ -3509,7 +3615,7 @@
           <a:p>
             <a:fld id="{97C62E4C-047F-4BB8-A7D6-928F0B6097C5}" type="datetimeFigureOut">
               <a:rPr lang="en-GB" smtClean="0"/>
-              <a:t>25/09/2022</a:t>
+              <a:t>30/09/2022</a:t>
             </a:fld>
             <a:endParaRPr lang="en-GB"/>
           </a:p>
@@ -3625,6 +3731,7 @@
     <p:sldLayoutId id="2147483657" r:id="rId9"/>
     <p:sldLayoutId id="2147483658" r:id="rId10"/>
     <p:sldLayoutId id="2147483659" r:id="rId11"/>
+    <p:sldLayoutId id="2147483660" r:id="rId12"/>
   </p:sldLayoutIdLst>
   <p:txStyles>
     <p:titleStyle>
@@ -6196,8 +6303,8 @@
         </p:nvSpPr>
         <p:spPr>
           <a:xfrm>
-            <a:off x="838200" y="2529932"/>
-            <a:ext cx="5078759" cy="2554545"/>
+            <a:off x="838200" y="2799955"/>
+            <a:ext cx="10815797" cy="2554545"/>
           </a:xfrm>
           <a:prstGeom prst="rect">
             <a:avLst/>
@@ -6212,6 +6319,41 @@
             <a:spAutoFit/>
           </a:bodyPr>
           <a:lstStyle/>
+          <a:p>
+            <a:r>
+              <a:rPr lang="en-US" sz="2000" dirty="0">
+                <a:solidFill>
+                  <a:srgbClr val="2F5496"/>
+                </a:solidFill>
+                <a:latin typeface="Calibri Light"/>
+                <a:cs typeface="Calibri"/>
+                <a:hlinkClick r:id="rId4">
+                  <a:extLst>
+                    <a:ext uri="{A12FA001-AC4F-418D-AE19-62706E023703}">
+                      <ahyp:hlinkClr xmlns:ahyp="http://schemas.microsoft.com/office/drawing/2018/hyperlinkcolor" val="tx"/>
+                    </a:ext>
+                  </a:extLst>
+                </a:hlinkClick>
+              </a:rPr>
+              <a:t>https://github.com/phil-a10/Talks/</a:t>
+            </a:r>
+          </a:p>
+          <a:p>
+            <a:endParaRPr lang="en-US" sz="2000" dirty="0">
+              <a:solidFill>
+                <a:srgbClr val="2F5496"/>
+              </a:solidFill>
+              <a:latin typeface="Calibri Light"/>
+              <a:cs typeface="Calibri"/>
+              <a:hlinkClick r:id="rId4">
+                <a:extLst>
+                  <a:ext uri="{A12FA001-AC4F-418D-AE19-62706E023703}">
+                    <ahyp:hlinkClr xmlns:ahyp="http://schemas.microsoft.com/office/drawing/2018/hyperlinkcolor" val="tx"/>
+                  </a:ext>
+                </a:extLst>
+              </a:hlinkClick>
+            </a:endParaRPr>
+          </a:p>
           <a:p>
             <a:r>
               <a:rPr lang="en-US" sz="2000" dirty="0">
@@ -6297,30 +6439,153 @@
               <a:cs typeface="Calibri"/>
             </a:endParaRPr>
           </a:p>
-          <a:p>
-            <a:endParaRPr lang="en-US" sz="2000" dirty="0">
-              <a:solidFill>
-                <a:srgbClr val="2F5496"/>
-              </a:solidFill>
-              <a:latin typeface="Calibri Light"/>
-              <a:cs typeface="Calibri"/>
-            </a:endParaRPr>
-          </a:p>
-          <a:p>
-            <a:endParaRPr lang="en-US" sz="2000" dirty="0">
-              <a:solidFill>
-                <a:srgbClr val="2F5496"/>
-              </a:solidFill>
-              <a:latin typeface="Calibri Light"/>
-              <a:cs typeface="Calibri"/>
-            </a:endParaRPr>
-          </a:p>
         </p:txBody>
       </p:sp>
     </p:spTree>
     <p:extLst>
       <p:ext uri="{BB962C8B-B14F-4D97-AF65-F5344CB8AC3E}">
         <p14:creationId xmlns:p14="http://schemas.microsoft.com/office/powerpoint/2010/main" val="2723236602"/>
+      </p:ext>
+    </p:extLst>
+  </p:cSld>
+  <p:clrMapOvr>
+    <a:masterClrMapping/>
+  </p:clrMapOvr>
+</p:sld>
+</file>
+
+<file path=ppt/slides/slide5.xml><?xml version="1.0" encoding="utf-8"?>
+<p:sld xmlns:a="http://schemas.openxmlformats.org/drawingml/2006/main" xmlns:r="http://schemas.openxmlformats.org/officeDocument/2006/relationships" xmlns:p="http://schemas.openxmlformats.org/presentationml/2006/main">
+  <p:cSld>
+    <p:spTree>
+      <p:nvGrpSpPr>
+        <p:cNvPr id="1" name=""/>
+        <p:cNvGrpSpPr/>
+        <p:nvPr/>
+      </p:nvGrpSpPr>
+      <p:grpSpPr>
+        <a:xfrm>
+          <a:off x="0" y="0"/>
+          <a:ext cx="0" cy="0"/>
+          <a:chOff x="0" y="0"/>
+          <a:chExt cx="0" cy="0"/>
+        </a:xfrm>
+      </p:grpSpPr>
+      <p:sp>
+        <p:nvSpPr>
+          <p:cNvPr id="2" name="Subtitle 1">
+            <a:extLst>
+              <a:ext uri="{FF2B5EF4-FFF2-40B4-BE49-F238E27FC236}">
+                <a16:creationId xmlns:a16="http://schemas.microsoft.com/office/drawing/2014/main" id="{F8084B5F-EC01-CA44-A6A1-1C08F964DCBB}"/>
+              </a:ext>
+            </a:extLst>
+          </p:cNvPr>
+          <p:cNvSpPr>
+            <a:spLocks noGrp="1"/>
+          </p:cNvSpPr>
+          <p:nvPr>
+            <p:ph type="subTitle" idx="1"/>
+          </p:nvPr>
+        </p:nvSpPr>
+        <p:spPr/>
+        <p:txBody>
+          <a:bodyPr/>
+          <a:lstStyle/>
+          <a:p>
+            <a:r>
+              <a:rPr lang="en-US" dirty="0"/>
+              <a:t>Feb 2020</a:t>
+            </a:r>
+          </a:p>
+        </p:txBody>
+      </p:sp>
+      <p:sp>
+        <p:nvSpPr>
+          <p:cNvPr id="3" name="Title 2">
+            <a:extLst>
+              <a:ext uri="{FF2B5EF4-FFF2-40B4-BE49-F238E27FC236}">
+                <a16:creationId xmlns:a16="http://schemas.microsoft.com/office/drawing/2014/main" id="{6D3D0DDB-5B84-7D4F-8E63-3A4FD5D1F6FA}"/>
+              </a:ext>
+            </a:extLst>
+          </p:cNvPr>
+          <p:cNvSpPr>
+            <a:spLocks noGrp="1"/>
+          </p:cNvSpPr>
+          <p:nvPr>
+            <p:ph type="title"/>
+          </p:nvPr>
+        </p:nvSpPr>
+        <p:spPr/>
+        <p:txBody>
+          <a:bodyPr/>
+          <a:lstStyle/>
+          <a:p>
+            <a:r>
+              <a:rPr lang="en-US" dirty="0"/>
+              <a:t>Company Update</a:t>
+            </a:r>
+          </a:p>
+        </p:txBody>
+      </p:sp>
+    </p:spTree>
+    <p:extLst>
+      <p:ext uri="{BB962C8B-B14F-4D97-AF65-F5344CB8AC3E}">
+        <p14:creationId xmlns:p14="http://schemas.microsoft.com/office/powerpoint/2010/main" val="2561676497"/>
+      </p:ext>
+    </p:extLst>
+  </p:cSld>
+  <p:clrMapOvr>
+    <a:masterClrMapping/>
+  </p:clrMapOvr>
+</p:sld>
+</file>
+
+<file path=ppt/slides/slide6.xml><?xml version="1.0" encoding="utf-8"?>
+<p:sld xmlns:a="http://schemas.openxmlformats.org/drawingml/2006/main" xmlns:r="http://schemas.openxmlformats.org/officeDocument/2006/relationships" xmlns:p="http://schemas.openxmlformats.org/presentationml/2006/main">
+  <p:cSld>
+    <p:spTree>
+      <p:nvGrpSpPr>
+        <p:cNvPr id="1" name=""/>
+        <p:cNvGrpSpPr/>
+        <p:nvPr/>
+      </p:nvGrpSpPr>
+      <p:grpSpPr>
+        <a:xfrm>
+          <a:off x="0" y="0"/>
+          <a:ext cx="0" cy="0"/>
+          <a:chOff x="0" y="0"/>
+          <a:chExt cx="0" cy="0"/>
+        </a:xfrm>
+      </p:grpSpPr>
+      <p:sp>
+        <p:nvSpPr>
+          <p:cNvPr id="2" name="Title 1">
+            <a:extLst>
+              <a:ext uri="{FF2B5EF4-FFF2-40B4-BE49-F238E27FC236}">
+                <a16:creationId xmlns:a16="http://schemas.microsoft.com/office/drawing/2014/main" id="{7220E19F-9964-1443-944A-F6CA24F9BCBF}"/>
+              </a:ext>
+            </a:extLst>
+          </p:cNvPr>
+          <p:cNvSpPr>
+            <a:spLocks noGrp="1"/>
+          </p:cNvSpPr>
+          <p:nvPr>
+            <p:ph type="title"/>
+          </p:nvPr>
+        </p:nvSpPr>
+        <p:spPr/>
+        <p:txBody>
+          <a:bodyPr/>
+          <a:lstStyle/>
+          <a:p>
+            <a:endParaRPr lang="en-US"/>
+          </a:p>
+        </p:txBody>
+      </p:sp>
+    </p:spTree>
+    <p:extLst>
+      <p:ext uri="{BB962C8B-B14F-4D97-AF65-F5344CB8AC3E}">
+        <p14:creationId xmlns:p14="http://schemas.microsoft.com/office/powerpoint/2010/main" val="3201832150"/>
       </p:ext>
     </p:extLst>
   </p:cSld>
@@ -6921,21 +7186,6 @@
 </file>
 
 <file path=customXml/item1.xml><?xml version="1.0" encoding="utf-8"?>
-<p:properties xmlns:p="http://schemas.microsoft.com/office/2006/metadata/properties" xmlns:xsi="http://www.w3.org/2001/XMLSchema-instance" xmlns:pc="http://schemas.microsoft.com/office/infopath/2007/PartnerControls">
-  <documentManagement/>
-</p:properties>
-</file>
-
-<file path=customXml/item2.xml><?xml version="1.0" encoding="utf-8"?>
-<?mso-contentType ?>
-<FormTemplates xmlns="http://schemas.microsoft.com/sharepoint/v3/contenttype/forms">
-  <Display>DocumentLibraryForm</Display>
-  <Edit>DocumentLibraryForm</Edit>
-  <New>DocumentLibraryForm</New>
-</FormTemplates>
-</file>
-
-<file path=customXml/item3.xml><?xml version="1.0" encoding="utf-8"?>
 <ct:contentTypeSchema xmlns:ct="http://schemas.microsoft.com/office/2006/metadata/contentType" xmlns:ma="http://schemas.microsoft.com/office/2006/metadata/properties/metaAttributes" ct:_="" ma:_="" ma:contentTypeName="Document" ma:contentTypeID="0x010100FBB1B5EA396249469A265E2AFFA3D1CF" ma:contentTypeVersion="13" ma:contentTypeDescription="Create a new document." ma:contentTypeScope="" ma:versionID="b141d291728b83a8fcc03a75883dd331">
   <xsd:schema xmlns:xsd="http://www.w3.org/2001/XMLSchema" xmlns:xs="http://www.w3.org/2001/XMLSchema" xmlns:p="http://schemas.microsoft.com/office/2006/metadata/properties" xmlns:ns2="8ec32435-9101-4c97-8a3c-ccfc4b09d27a" xmlns:ns3="b8fcd98d-34a5-443c-9231-e77d014cc831" targetNamespace="http://schemas.microsoft.com/office/2006/metadata/properties" ma:root="true" ma:fieldsID="34a7861a6873264f6183a02b9797b2f1" ns2:_="" ns3:_="">
     <xsd:import namespace="8ec32435-9101-4c97-8a3c-ccfc4b09d27a"/>
@@ -7158,32 +7408,22 @@
 </ct:contentTypeSchema>
 </file>
 
-<file path=customXml/itemProps1.xml><?xml version="1.0" encoding="utf-8"?>
-<ds:datastoreItem xmlns:ds="http://schemas.openxmlformats.org/officeDocument/2006/customXml" ds:itemID="{6BCF04B9-23F0-4964-9563-F34447084483}">
-  <ds:schemaRefs>
-    <ds:schemaRef ds:uri="http://purl.org/dc/dcmitype/"/>
-    <ds:schemaRef ds:uri="http://purl.org/dc/terms/"/>
-    <ds:schemaRef ds:uri="b8fcd98d-34a5-443c-9231-e77d014cc831"/>
-    <ds:schemaRef ds:uri="http://schemas.microsoft.com/office/2006/documentManagement/types"/>
-    <ds:schemaRef ds:uri="http://purl.org/dc/elements/1.1/"/>
-    <ds:schemaRef ds:uri="http://schemas.microsoft.com/office/2006/metadata/properties"/>
-    <ds:schemaRef ds:uri="http://schemas.microsoft.com/office/infopath/2007/PartnerControls"/>
-    <ds:schemaRef ds:uri="http://www.w3.org/XML/1998/namespace"/>
-    <ds:schemaRef ds:uri="http://schemas.openxmlformats.org/package/2006/metadata/core-properties"/>
-    <ds:schemaRef ds:uri="8ec32435-9101-4c97-8a3c-ccfc4b09d27a"/>
-  </ds:schemaRefs>
-</ds:datastoreItem>
+<file path=customXml/item2.xml><?xml version="1.0" encoding="utf-8"?>
+<?mso-contentType ?>
+<FormTemplates xmlns="http://schemas.microsoft.com/sharepoint/v3/contenttype/forms">
+  <Display>DocumentLibraryForm</Display>
+  <Edit>DocumentLibraryForm</Edit>
+  <New>DocumentLibraryForm</New>
+</FormTemplates>
 </file>
 
-<file path=customXml/itemProps2.xml><?xml version="1.0" encoding="utf-8"?>
-<ds:datastoreItem xmlns:ds="http://schemas.openxmlformats.org/officeDocument/2006/customXml" ds:itemID="{2CB33670-BA4C-497A-82C4-7472D857EF72}">
-  <ds:schemaRefs>
-    <ds:schemaRef ds:uri="http://schemas.microsoft.com/sharepoint/v3/contenttype/forms"/>
-  </ds:schemaRefs>
-</ds:datastoreItem>
+<file path=customXml/item3.xml><?xml version="1.0" encoding="utf-8"?>
+<p:properties xmlns:p="http://schemas.microsoft.com/office/2006/metadata/properties" xmlns:xsi="http://www.w3.org/2001/XMLSchema-instance" xmlns:pc="http://schemas.microsoft.com/office/infopath/2007/PartnerControls">
+  <documentManagement/>
+</p:properties>
 </file>
 
-<file path=customXml/itemProps3.xml><?xml version="1.0" encoding="utf-8"?>
+<file path=customXml/itemProps1.xml><?xml version="1.0" encoding="utf-8"?>
 <ds:datastoreItem xmlns:ds="http://schemas.openxmlformats.org/officeDocument/2006/customXml" ds:itemID="{3DF60798-9B04-43FD-B5B0-24F9F1212BF9}">
   <ds:schemaRefs>
     <ds:schemaRef ds:uri="8ec32435-9101-4c97-8a3c-ccfc4b09d27a"/>
@@ -7200,4 +7440,29 @@
     <ds:schemaRef ds:uri="http://www.w3.org/2001/XMLSchema"/>
   </ds:schemaRefs>
 </ds:datastoreItem>
+</file>
+
+<file path=customXml/itemProps2.xml><?xml version="1.0" encoding="utf-8"?>
+<ds:datastoreItem xmlns:ds="http://schemas.openxmlformats.org/officeDocument/2006/customXml" ds:itemID="{2CB33670-BA4C-497A-82C4-7472D857EF72}">
+  <ds:schemaRefs>
+    <ds:schemaRef ds:uri="http://schemas.microsoft.com/sharepoint/v3/contenttype/forms"/>
+  </ds:schemaRefs>
+</ds:datastoreItem>
+</file>
+
+<file path=customXml/itemProps3.xml><?xml version="1.0" encoding="utf-8"?>
+<ds:datastoreItem xmlns:ds="http://schemas.openxmlformats.org/officeDocument/2006/customXml" ds:itemID="{6BCF04B9-23F0-4964-9563-F34447084483}">
+  <ds:schemaRefs>
+    <ds:schemaRef ds:uri="http://purl.org/dc/dcmitype/"/>
+    <ds:schemaRef ds:uri="http://purl.org/dc/terms/"/>
+    <ds:schemaRef ds:uri="b8fcd98d-34a5-443c-9231-e77d014cc831"/>
+    <ds:schemaRef ds:uri="http://schemas.microsoft.com/office/2006/documentManagement/types"/>
+    <ds:schemaRef ds:uri="http://purl.org/dc/elements/1.1/"/>
+    <ds:schemaRef ds:uri="http://schemas.microsoft.com/office/2006/metadata/properties"/>
+    <ds:schemaRef ds:uri="http://schemas.microsoft.com/office/infopath/2007/PartnerControls"/>
+    <ds:schemaRef ds:uri="http://www.w3.org/XML/1998/namespace"/>
+    <ds:schemaRef ds:uri="http://schemas.openxmlformats.org/package/2006/metadata/core-properties"/>
+    <ds:schemaRef ds:uri="8ec32435-9101-4c97-8a3c-ccfc4b09d27a"/>
+  </ds:schemaRefs>
+</ds:datastoreItem>
 </file>
</xml_diff>